<commit_message>
Added references, thank-you-for-your-attention-page and generalized font type and font size
</commit_message>
<xml_diff>
--- a/slides-decks/pitch-presentation.pptx
+++ b/slides-decks/pitch-presentation.pptx
@@ -5,10 +5,10 @@
     <p:sldMasterId id="2147483661" r:id="rId1"/>
   </p:sldMasterIdLst>
   <p:notesMasterIdLst>
-    <p:notesMasterId r:id="rId7"/>
+    <p:notesMasterId r:id="rId9"/>
   </p:notesMasterIdLst>
   <p:handoutMasterIdLst>
-    <p:handoutMasterId r:id="rId8"/>
+    <p:handoutMasterId r:id="rId10"/>
   </p:handoutMasterIdLst>
   <p:sldIdLst>
     <p:sldId id="362" r:id="rId2"/>
@@ -16,6 +16,8 @@
     <p:sldId id="364" r:id="rId4"/>
     <p:sldId id="359" r:id="rId5"/>
     <p:sldId id="357" r:id="rId6"/>
+    <p:sldId id="334" r:id="rId7"/>
+    <p:sldId id="365" r:id="rId8"/>
   </p:sldIdLst>
   <p:sldSz cx="9144000" cy="5143500" type="screen16x9"/>
   <p:notesSz cx="6858000" cy="9144000"/>
@@ -2196,20 +2198,11 @@
         <a:lstStyle/>
         <a:p>
           <a:r>
-            <a:rPr lang="de-DE" sz="1300" dirty="0">
-              <a:latin typeface="+mn-lt"/>
+            <a:rPr lang="en-GB" sz="1300" noProof="0" dirty="0">
+              <a:latin typeface="+mj-lt"/>
             </a:rPr>
-            <a:t>Data </a:t>
+            <a:t>Data understanding</a:t>
           </a:r>
-          <a:r>
-            <a:rPr lang="de-DE" sz="1300" dirty="0" err="1">
-              <a:latin typeface="+mn-lt"/>
-            </a:rPr>
-            <a:t>understanding</a:t>
-          </a:r>
-          <a:endParaRPr lang="de-DE" sz="1300" dirty="0">
-            <a:latin typeface="+mn-lt"/>
-          </a:endParaRPr>
         </a:p>
       </dgm:t>
     </dgm:pt>
@@ -2236,14 +2229,16 @@
       </dgm:t>
     </dgm:pt>
     <dgm:pt modelId="{327E0742-85F2-4853-B3CD-87BE1DCEB695}">
-      <dgm:prSet phldrT="[Text]"/>
+      <dgm:prSet phldrT="[Text]" custT="1"/>
       <dgm:spPr/>
       <dgm:t>
         <a:bodyPr/>
         <a:lstStyle/>
         <a:p>
           <a:r>
-            <a:rPr lang="en-GB" noProof="0" dirty="0"/>
+            <a:rPr lang="en-GB" sz="1300" noProof="0" dirty="0">
+              <a:latin typeface="+mj-lt"/>
+            </a:rPr>
             <a:t>Data preparation</a:t>
           </a:r>
         </a:p>
@@ -2272,14 +2267,16 @@
       </dgm:t>
     </dgm:pt>
     <dgm:pt modelId="{5BE61B6E-D577-4C27-B68E-139B2678A958}">
-      <dgm:prSet phldrT="[Text]"/>
+      <dgm:prSet phldrT="[Text]" custT="1"/>
       <dgm:spPr/>
       <dgm:t>
         <a:bodyPr/>
         <a:lstStyle/>
         <a:p>
           <a:r>
-            <a:rPr lang="de-DE" dirty="0"/>
+            <a:rPr lang="de-DE" sz="1300" dirty="0">
+              <a:latin typeface="+mj-lt"/>
+            </a:rPr>
             <a:t>Modeling</a:t>
           </a:r>
         </a:p>
@@ -2354,7 +2351,9 @@
         <a:lstStyle/>
         <a:p>
           <a:r>
-            <a:rPr lang="de-DE" dirty="0"/>
+            <a:rPr lang="de-DE" dirty="0">
+              <a:latin typeface="+mj-lt"/>
+            </a:rPr>
             <a:t>Evaluation</a:t>
           </a:r>
         </a:p>
@@ -2392,7 +2391,7 @@
       <dgm:spPr/>
     </dgm:pt>
     <dgm:pt modelId="{22780320-31A6-404F-806A-E274ACCC95D6}" type="pres">
-      <dgm:prSet presAssocID="{5E501B61-D7ED-4924-AFAB-02631C25AACB}" presName="node" presStyleLbl="node1" presStyleIdx="0" presStyleCnt="4" custScaleX="130203" custScaleY="69596">
+      <dgm:prSet presAssocID="{5E501B61-D7ED-4924-AFAB-02631C25AACB}" presName="node" presStyleLbl="node1" presStyleIdx="0" presStyleCnt="4" custScaleX="137684" custScaleY="69596">
         <dgm:presLayoutVars>
           <dgm:bulletEnabled val="1"/>
         </dgm:presLayoutVars>
@@ -2408,7 +2407,7 @@
       <dgm:spPr/>
     </dgm:pt>
     <dgm:pt modelId="{541E8805-E79F-45D5-920F-81E31F0B6AC7}" type="pres">
-      <dgm:prSet presAssocID="{327E0742-85F2-4853-B3CD-87BE1DCEB695}" presName="node" presStyleLbl="node1" presStyleIdx="1" presStyleCnt="4" custScaleY="64485" custRadScaleRad="143021">
+      <dgm:prSet presAssocID="{327E0742-85F2-4853-B3CD-87BE1DCEB695}" presName="node" presStyleLbl="node1" presStyleIdx="1" presStyleCnt="4" custScaleX="117445" custScaleY="64485" custRadScaleRad="143021">
         <dgm:presLayoutVars>
           <dgm:bulletEnabled val="1"/>
         </dgm:presLayoutVars>
@@ -3160,8 +3159,8 @@
       </dsp:nvSpPr>
       <dsp:spPr>
         <a:xfrm>
-          <a:off x="2156279" y="276135"/>
-          <a:ext cx="1500434" cy="802010"/>
+          <a:off x="2062916" y="276135"/>
+          <a:ext cx="1586643" cy="802010"/>
         </a:xfrm>
         <a:prstGeom prst="ellipse">
           <a:avLst/>
@@ -3248,25 +3247,16 @@
             <a:buNone/>
           </a:pPr>
           <a:r>
-            <a:rPr lang="de-DE" sz="1300" kern="1200" dirty="0">
-              <a:latin typeface="+mn-lt"/>
+            <a:rPr lang="en-GB" sz="1300" kern="1200" noProof="0" dirty="0">
+              <a:latin typeface="+mj-lt"/>
             </a:rPr>
-            <a:t>Data </a:t>
+            <a:t>Data understanding</a:t>
           </a:r>
-          <a:r>
-            <a:rPr lang="de-DE" sz="1300" kern="1200" dirty="0" err="1">
-              <a:latin typeface="+mn-lt"/>
-            </a:rPr>
-            <a:t>understanding</a:t>
-          </a:r>
-          <a:endParaRPr lang="de-DE" sz="1300" kern="1200" dirty="0">
-            <a:latin typeface="+mn-lt"/>
-          </a:endParaRPr>
         </a:p>
       </dsp:txBody>
       <dsp:txXfrm>
-        <a:off x="2376012" y="393587"/>
-        <a:ext cx="1060968" cy="567106"/>
+        <a:off x="2295274" y="393587"/>
+        <a:ext cx="1121927" cy="567106"/>
       </dsp:txXfrm>
     </dsp:sp>
     <dsp:sp modelId="{6A70F7A4-3C74-45AB-83D3-11E374934133}">
@@ -3276,8 +3266,8 @@
       </dsp:nvSpPr>
       <dsp:spPr>
         <a:xfrm rot="2097670">
-          <a:off x="3508350" y="1108000"/>
-          <a:ext cx="584982" cy="388928"/>
+          <a:off x="3461350" y="1102036"/>
+          <a:ext cx="561404" cy="388928"/>
         </a:xfrm>
         <a:prstGeom prst="rightArrow">
           <a:avLst>
@@ -3370,8 +3360,8 @@
         </a:p>
       </dsp:txBody>
       <dsp:txXfrm>
-        <a:off x="3518878" y="1152357"/>
-        <a:ext cx="468304" cy="233356"/>
+        <a:off x="3471878" y="1146393"/>
+        <a:ext cx="444726" cy="233356"/>
       </dsp:txXfrm>
     </dsp:sp>
     <dsp:sp modelId="{541E8805-E79F-45D5-920F-81E31F0B6AC7}">
@@ -3381,8 +3371,8 @@
       </dsp:nvSpPr>
       <dsp:spPr>
         <a:xfrm>
-          <a:off x="4081134" y="1529759"/>
-          <a:ext cx="1152380" cy="743112"/>
+          <a:off x="3930359" y="1529759"/>
+          <a:ext cx="1353413" cy="743112"/>
         </a:xfrm>
         <a:prstGeom prst="ellipse">
           <a:avLst/>
@@ -3469,14 +3459,16 @@
             <a:buNone/>
           </a:pPr>
           <a:r>
-            <a:rPr lang="en-GB" sz="1300" kern="1200" noProof="0" dirty="0"/>
+            <a:rPr lang="en-GB" sz="1300" kern="1200" noProof="0" dirty="0">
+              <a:latin typeface="+mj-lt"/>
+            </a:rPr>
             <a:t>Data preparation</a:t>
           </a:r>
         </a:p>
       </dsp:txBody>
       <dsp:txXfrm>
-        <a:off x="4249896" y="1638585"/>
-        <a:ext cx="814856" cy="525460"/>
+        <a:off x="4128562" y="1638585"/>
+        <a:ext cx="957007" cy="525460"/>
       </dsp:txXfrm>
     </dsp:sp>
     <dsp:sp modelId="{2C444C6F-062A-41C8-8963-51700C9023C1}">
@@ -3486,8 +3478,8 @@
       </dsp:nvSpPr>
       <dsp:spPr>
         <a:xfrm rot="8702330">
-          <a:off x="3484744" y="2308015"/>
-          <a:ext cx="625578" cy="388928"/>
+          <a:off x="3429253" y="2317848"/>
+          <a:ext cx="607918" cy="388928"/>
         </a:xfrm>
         <a:prstGeom prst="rightArrow">
           <a:avLst>
@@ -3580,8 +3572,8 @@
         </a:p>
       </dsp:txBody>
       <dsp:txXfrm rot="10800000">
-        <a:off x="3590894" y="2352372"/>
-        <a:ext cx="508900" cy="233356"/>
+        <a:off x="3535403" y="2362205"/>
+        <a:ext cx="491240" cy="233356"/>
       </dsp:txXfrm>
     </dsp:sp>
     <dsp:sp modelId="{4E636499-2023-466B-97A0-EC2DBC9E55FE}">
@@ -3591,7 +3583,7 @@
       </dsp:nvSpPr>
       <dsp:spPr>
         <a:xfrm>
-          <a:off x="2330306" y="2749987"/>
+          <a:off x="2280048" y="2749987"/>
           <a:ext cx="1152380" cy="751006"/>
         </a:xfrm>
         <a:prstGeom prst="ellipse">
@@ -3679,13 +3671,15 @@
             <a:buNone/>
           </a:pPr>
           <a:r>
-            <a:rPr lang="de-DE" sz="1300" kern="1200" dirty="0"/>
+            <a:rPr lang="de-DE" sz="1300" kern="1200" dirty="0">
+              <a:latin typeface="+mj-lt"/>
+            </a:rPr>
             <a:t>Modeling</a:t>
           </a:r>
         </a:p>
       </dsp:txBody>
       <dsp:txXfrm>
-        <a:off x="2499068" y="2859969"/>
+        <a:off x="2448810" y="2859969"/>
         <a:ext cx="814856" cy="531042"/>
       </dsp:txXfrm>
     </dsp:sp>
@@ -3696,7 +3690,7 @@
       </dsp:nvSpPr>
       <dsp:spPr>
         <a:xfrm rot="12939467">
-          <a:off x="1756888" y="2326108"/>
+          <a:off x="1706630" y="2326108"/>
           <a:ext cx="612929" cy="388928"/>
         </a:xfrm>
         <a:prstGeom prst="rightArrow">
@@ -3790,7 +3784,7 @@
         </a:p>
       </dsp:txBody>
       <dsp:txXfrm rot="10800000">
-        <a:off x="1862628" y="2437902"/>
+        <a:off x="1812370" y="2437902"/>
         <a:ext cx="496251" cy="233356"/>
       </dsp:txXfrm>
     </dsp:sp>
@@ -3801,7 +3795,7 @@
       </dsp:nvSpPr>
       <dsp:spPr>
         <a:xfrm>
-          <a:off x="625435" y="1543307"/>
+          <a:off x="575176" y="1543307"/>
           <a:ext cx="1152380" cy="718025"/>
         </a:xfrm>
         <a:prstGeom prst="ellipse">
@@ -3889,13 +3883,15 @@
             <a:buNone/>
           </a:pPr>
           <a:r>
-            <a:rPr lang="de-DE" sz="1300" kern="1200" dirty="0"/>
+            <a:rPr lang="de-DE" sz="1300" kern="1200" dirty="0">
+              <a:latin typeface="+mj-lt"/>
+            </a:rPr>
             <a:t>Evaluation</a:t>
           </a:r>
         </a:p>
       </dsp:txBody>
       <dsp:txXfrm>
-        <a:off x="794197" y="1648459"/>
+        <a:off x="743938" y="1648459"/>
         <a:ext cx="814856" cy="507721"/>
       </dsp:txXfrm>
     </dsp:sp>
@@ -3906,8 +3902,8 @@
       </dsp:nvSpPr>
       <dsp:spPr>
         <a:xfrm rot="19457861">
-          <a:off x="1718659" y="1130002"/>
-          <a:ext cx="574131" cy="388928"/>
+          <a:off x="1667024" y="1133026"/>
+          <a:ext cx="568469" cy="388928"/>
         </a:xfrm>
         <a:prstGeom prst="rightArrow">
           <a:avLst>
@@ -4000,8 +3996,8 @@
         </a:p>
       </dsp:txBody>
       <dsp:txXfrm>
-        <a:off x="1729623" y="1241833"/>
-        <a:ext cx="457453" cy="233356"/>
+        <a:off x="1677988" y="1244857"/>
+        <a:ext cx="451791" cy="233356"/>
       </dsp:txXfrm>
     </dsp:sp>
   </dsp:spTree>
@@ -6596,7 +6592,7 @@
           <a:p>
             <a:fld id="{BEC3DE6D-5274-244B-B15A-CB35AEE3E9B9}" type="datetimeFigureOut">
               <a:rPr lang="de-DE" smtClean="0"/>
-              <a:t>08.11.2024</a:t>
+              <a:t>09.11.2024</a:t>
             </a:fld>
             <a:endParaRPr lang="de-DE"/>
           </a:p>
@@ -6773,7 +6769,7 @@
           <a:p>
             <a:fld id="{5DA3EDBF-8EBB-C249-842F-9CF2CB15B0A8}" type="datetimeFigureOut">
               <a:rPr lang="de-DE" smtClean="0"/>
-              <a:t>08.11.2024</a:t>
+              <a:t>09.11.2024</a:t>
             </a:fld>
             <a:endParaRPr lang="de-DE"/>
           </a:p>
@@ -7293,7 +7289,34 @@
               <a:rPr lang="de-DE" dirty="0" err="1"/>
               <a:t>preferences</a:t>
             </a:r>
-            <a:endParaRPr lang="de-DE" dirty="0"/>
+            <a:r>
+              <a:rPr lang="de-DE" dirty="0"/>
+              <a:t> (</a:t>
+            </a:r>
+            <a:r>
+              <a:rPr lang="de-DE" dirty="0" err="1"/>
+              <a:t>only</a:t>
+            </a:r>
+            <a:r>
+              <a:rPr lang="de-DE" dirty="0"/>
+              <a:t> </a:t>
+            </a:r>
+            <a:r>
+              <a:rPr lang="de-DE" dirty="0" err="1"/>
+              <a:t>for</a:t>
+            </a:r>
+            <a:r>
+              <a:rPr lang="de-DE" dirty="0"/>
+              <a:t> </a:t>
+            </a:r>
+            <a:r>
+              <a:rPr lang="de-DE" dirty="0" err="1"/>
+              <a:t>movies</a:t>
+            </a:r>
+            <a:r>
+              <a:rPr lang="de-DE" dirty="0"/>
+              <a:t>)</a:t>
+            </a:r>
           </a:p>
           <a:p>
             <a:pPr marL="0" marR="0" lvl="0" indent="0" algn="l" defTabSz="914400" rtl="0" eaLnBrk="1" fontAlgn="auto" latinLnBrk="0" hangingPunct="1">
@@ -8274,7 +8297,7 @@
           <a:p>
             <a:fld id="{6F4BF715-53B1-40EB-A66E-01397EB26388}" type="datetime1">
               <a:rPr lang="en-US" smtClean="0"/>
-              <a:t>11/8/2024</a:t>
+              <a:t>11/9/2024</a:t>
             </a:fld>
             <a:endParaRPr lang="de-DE" dirty="0"/>
           </a:p>
@@ -8591,7 +8614,7 @@
           <a:p>
             <a:fld id="{043D633C-BF99-4DD6-BA84-06D1EB440CCB}" type="datetime1">
               <a:rPr lang="en-US" smtClean="0"/>
-              <a:t>11/8/2024</a:t>
+              <a:t>11/9/2024</a:t>
             </a:fld>
             <a:endParaRPr lang="de-DE" dirty="0"/>
           </a:p>
@@ -8931,7 +8954,7 @@
           <a:p>
             <a:fld id="{58E149D8-DD11-4FE8-9D8A-EBD1293882C9}" type="datetime1">
               <a:rPr lang="en-US" smtClean="0"/>
-              <a:t>11/8/2024</a:t>
+              <a:t>11/9/2024</a:t>
             </a:fld>
             <a:endParaRPr lang="de-DE" dirty="0"/>
           </a:p>
@@ -9465,7 +9488,7 @@
           <a:p>
             <a:fld id="{D63F9D46-168C-4149-A497-E6A7A85B43FE}" type="datetime1">
               <a:rPr lang="en-US" smtClean="0"/>
-              <a:t>11/8/2024</a:t>
+              <a:t>11/9/2024</a:t>
             </a:fld>
             <a:endParaRPr lang="de-DE" dirty="0"/>
           </a:p>
@@ -9791,7 +9814,7 @@
           <a:p>
             <a:fld id="{5D8820E3-F72B-440D-814E-5831159EA788}" type="datetime1">
               <a:rPr lang="en-US" smtClean="0"/>
-              <a:t>11/8/2024</a:t>
+              <a:t>11/9/2024</a:t>
             </a:fld>
             <a:endParaRPr lang="de-DE" dirty="0"/>
           </a:p>
@@ -9940,7 +9963,7 @@
           <a:p>
             <a:fld id="{95C608CC-00D3-4589-9B5F-42D955AB8FA5}" type="datetime1">
               <a:rPr lang="en-US" smtClean="0"/>
-              <a:t>11/8/2024</a:t>
+              <a:t>11/9/2024</a:t>
             </a:fld>
             <a:endParaRPr lang="de-DE" dirty="0"/>
           </a:p>
@@ -10252,7 +10275,7 @@
           <a:p>
             <a:fld id="{93FC3826-9A27-4F3F-9E51-7F77A51FB7BA}" type="datetime1">
               <a:rPr lang="en-US" smtClean="0"/>
-              <a:t>11/8/2024</a:t>
+              <a:t>11/9/2024</a:t>
             </a:fld>
             <a:endParaRPr lang="de-DE" dirty="0"/>
           </a:p>
@@ -10509,7 +10532,7 @@
           <a:p>
             <a:fld id="{A87E0087-D8BA-4A4B-BD00-C9DFE10B5D13}" type="datetime1">
               <a:rPr lang="en-US" smtClean="0"/>
-              <a:t>11/8/2024</a:t>
+              <a:t>11/9/2024</a:t>
             </a:fld>
             <a:endParaRPr lang="de-DE" dirty="0"/>
           </a:p>
@@ -11328,7 +11351,7 @@
             </a:pPr>
             <a:fld id="{5D31866D-8C34-4F8A-AAEE-A4969690E1DC}" type="datetime1">
               <a:rPr lang="en-US" smtClean="0"/>
-              <a:t>11/8/2024</a:t>
+              <a:t>11/9/2024</a:t>
             </a:fld>
             <a:endParaRPr lang="de-DE"/>
           </a:p>
@@ -11843,7 +11866,7 @@
                   <a:spcPts val="600"/>
                 </a:spcAft>
               </a:pPr>
-              <a:t>11/8/2024</a:t>
+              <a:t>11/9/2024</a:t>
             </a:fld>
             <a:endParaRPr lang="de-DE"/>
           </a:p>
@@ -12011,7 +12034,7 @@
                   <a:spcPts val="600"/>
                 </a:spcAft>
               </a:pPr>
-              <a:t>11/8/2024</a:t>
+              <a:t>11/9/2024</a:t>
             </a:fld>
             <a:endParaRPr lang="de-DE"/>
           </a:p>
@@ -12227,7 +12250,7 @@
           <a:p>
             <a:fld id="{7F578030-2DC2-4F9B-AF93-74D5D182CE17}" type="datetime1">
               <a:rPr lang="en-US" smtClean="0"/>
-              <a:t>11/8/2024</a:t>
+              <a:t>11/9/2024</a:t>
             </a:fld>
             <a:endParaRPr lang="de-DE" dirty="0"/>
           </a:p>
@@ -12357,7 +12380,7 @@
             <p:nvPr>
               <p:extLst>
                 <p:ext uri="{D42A27DB-BD31-4B8C-83A1-F6EECF244321}">
-                  <p14:modId xmlns:p14="http://schemas.microsoft.com/office/powerpoint/2010/main" val="3667814675"/>
+                  <p14:modId xmlns:p14="http://schemas.microsoft.com/office/powerpoint/2010/main" val="3406357504"/>
                 </p:ext>
               </p:extLst>
             </p:nvPr>
@@ -12423,8 +12446,8 @@
         </p:nvGrpSpPr>
         <p:grpSpPr>
           <a:xfrm>
-            <a:off x="690645" y="3839470"/>
-            <a:ext cx="1226343" cy="745569"/>
+            <a:off x="537813" y="3839470"/>
+            <a:ext cx="1379176" cy="745569"/>
             <a:chOff x="3926250" y="1083982"/>
             <a:chExt cx="1226343" cy="1226343"/>
           </a:xfrm>
@@ -12541,10 +12564,14 @@
                 <a:buNone/>
               </a:pPr>
               <a:r>
-                <a:rPr lang="de-DE" sz="1300" kern="1200" dirty="0" err="1"/>
+                <a:rPr lang="de-DE" sz="1300" kern="1200" dirty="0" err="1">
+                  <a:latin typeface="+mj-lt"/>
+                </a:rPr>
                 <a:t>Deployment</a:t>
               </a:r>
-              <a:endParaRPr lang="de-DE" sz="1300" kern="1200" dirty="0"/>
+              <a:endParaRPr lang="de-DE" sz="1300" kern="1200" dirty="0">
+                <a:latin typeface="+mj-lt"/>
+              </a:endParaRPr>
             </a:p>
           </p:txBody>
         </p:sp>
@@ -12763,6 +12790,467 @@
     <p:extLst>
       <p:ext uri="{BB962C8B-B14F-4D97-AF65-F5344CB8AC3E}">
         <p14:creationId xmlns:p14="http://schemas.microsoft.com/office/powerpoint/2010/main" val="1811999993"/>
+      </p:ext>
+    </p:extLst>
+  </p:cSld>
+  <p:clrMapOvr>
+    <a:masterClrMapping/>
+  </p:clrMapOvr>
+</p:sld>
+</file>
+
+<file path=ppt/slides/slide6.xml><?xml version="1.0" encoding="utf-8"?>
+<p:sld xmlns:a="http://schemas.openxmlformats.org/drawingml/2006/main" xmlns:r="http://schemas.openxmlformats.org/officeDocument/2006/relationships" xmlns:p="http://schemas.openxmlformats.org/presentationml/2006/main">
+  <p:cSld>
+    <p:spTree>
+      <p:nvGrpSpPr>
+        <p:cNvPr id="1" name=""/>
+        <p:cNvGrpSpPr/>
+        <p:nvPr/>
+      </p:nvGrpSpPr>
+      <p:grpSpPr>
+        <a:xfrm>
+          <a:off x="0" y="0"/>
+          <a:ext cx="0" cy="0"/>
+          <a:chOff x="0" y="0"/>
+          <a:chExt cx="0" cy="0"/>
+        </a:xfrm>
+      </p:grpSpPr>
+      <p:sp>
+        <p:nvSpPr>
+          <p:cNvPr id="3" name="Title 1">
+            <a:extLst>
+              <a:ext uri="{FF2B5EF4-FFF2-40B4-BE49-F238E27FC236}">
+                <a16:creationId xmlns:a16="http://schemas.microsoft.com/office/drawing/2014/main" id="{619D84E7-551B-2F4B-9892-ED6F6EB890BC}"/>
+              </a:ext>
+            </a:extLst>
+          </p:cNvPr>
+          <p:cNvSpPr txBox="1">
+            <a:spLocks/>
+          </p:cNvSpPr>
+          <p:nvPr/>
+        </p:nvSpPr>
+        <p:spPr>
+          <a:xfrm>
+            <a:off x="632630" y="1157743"/>
+            <a:ext cx="6215063" cy="1105304"/>
+          </a:xfrm>
+          <a:prstGeom prst="rect">
+            <a:avLst/>
+          </a:prstGeom>
+        </p:spPr>
+        <p:txBody>
+          <a:bodyPr anchor="t"/>
+          <a:lstStyle>
+            <a:lvl1pPr marL="0" marR="0" indent="0" algn="l" defTabSz="896095" rtl="0" eaLnBrk="1" fontAlgn="auto" latinLnBrk="0" hangingPunct="1">
+              <a:lnSpc>
+                <a:spcPct val="90000"/>
+              </a:lnSpc>
+              <a:spcBef>
+                <a:spcPct val="0"/>
+              </a:spcBef>
+              <a:spcAft>
+                <a:spcPts val="0"/>
+              </a:spcAft>
+              <a:buClrTx/>
+              <a:buSzTx/>
+              <a:buFontTx/>
+              <a:buNone/>
+              <a:tabLst/>
+              <a:defRPr sz="3332" b="1" kern="1200">
+                <a:solidFill>
+                  <a:schemeClr val="tx1"/>
+                </a:solidFill>
+                <a:latin typeface="Arial" charset="0"/>
+                <a:ea typeface="Arial" charset="0"/>
+                <a:cs typeface="Arial" charset="0"/>
+              </a:defRPr>
+            </a:lvl1pPr>
+          </a:lstStyle>
+          <a:p>
+            <a:pPr>
+              <a:lnSpc>
+                <a:spcPct val="100000"/>
+              </a:lnSpc>
+            </a:pPr>
+            <a:r>
+              <a:rPr lang="de-DE" sz="3600" dirty="0" err="1"/>
+              <a:t>Thank</a:t>
+            </a:r>
+            <a:r>
+              <a:rPr lang="de-DE" sz="3600" dirty="0"/>
+              <a:t> </a:t>
+            </a:r>
+            <a:r>
+              <a:rPr lang="de-DE" sz="3600" dirty="0" err="1"/>
+              <a:t>you</a:t>
+            </a:r>
+            <a:r>
+              <a:rPr lang="de-DE" sz="3600" dirty="0"/>
+              <a:t> </a:t>
+            </a:r>
+            <a:r>
+              <a:rPr lang="de-DE" sz="3600" dirty="0" err="1"/>
+              <a:t>for</a:t>
+            </a:r>
+            <a:r>
+              <a:rPr lang="de-DE" sz="3600" dirty="0"/>
+              <a:t> </a:t>
+            </a:r>
+            <a:br>
+              <a:rPr lang="de-DE" sz="3600" dirty="0"/>
+            </a:br>
+            <a:r>
+              <a:rPr lang="de-DE" sz="3600" dirty="0" err="1"/>
+              <a:t>your</a:t>
+            </a:r>
+            <a:r>
+              <a:rPr lang="de-DE" sz="3600" dirty="0"/>
+              <a:t> </a:t>
+            </a:r>
+            <a:r>
+              <a:rPr lang="de-DE" sz="3600" dirty="0" err="1"/>
+              <a:t>attention</a:t>
+            </a:r>
+            <a:r>
+              <a:rPr lang="de-DE" sz="3600" dirty="0"/>
+              <a:t>!</a:t>
+            </a:r>
+            <a:endParaRPr lang="en-US" sz="3600" dirty="0"/>
+          </a:p>
+        </p:txBody>
+      </p:sp>
+      <p:sp>
+        <p:nvSpPr>
+          <p:cNvPr id="7" name="Datumsplatzhalter 6">
+            <a:extLst>
+              <a:ext uri="{FF2B5EF4-FFF2-40B4-BE49-F238E27FC236}">
+                <a16:creationId xmlns:a16="http://schemas.microsoft.com/office/drawing/2014/main" id="{34C7BF68-4E05-D143-BE35-CBC49B2D749F}"/>
+              </a:ext>
+            </a:extLst>
+          </p:cNvPr>
+          <p:cNvSpPr>
+            <a:spLocks noGrp="1"/>
+          </p:cNvSpPr>
+          <p:nvPr>
+            <p:ph type="dt" sz="half" idx="10"/>
+          </p:nvPr>
+        </p:nvSpPr>
+        <p:spPr>
+          <a:xfrm>
+            <a:off x="1390942" y="4767263"/>
+            <a:ext cx="2057400" cy="274637"/>
+          </a:xfrm>
+        </p:spPr>
+        <p:txBody>
+          <a:bodyPr/>
+          <a:lstStyle/>
+          <a:p>
+            <a:fld id="{DE4D170F-E1B5-43B0-AB9C-EA75CA95E556}" type="datetime3">
+              <a:rPr lang="de-DE" smtClean="0"/>
+              <a:t>09/11/24</a:t>
+            </a:fld>
+            <a:endParaRPr lang="de-DE" dirty="0"/>
+          </a:p>
+        </p:txBody>
+      </p:sp>
+      <p:sp>
+        <p:nvSpPr>
+          <p:cNvPr id="9" name="Foliennummernplatzhalter 8">
+            <a:extLst>
+              <a:ext uri="{FF2B5EF4-FFF2-40B4-BE49-F238E27FC236}">
+                <a16:creationId xmlns:a16="http://schemas.microsoft.com/office/drawing/2014/main" id="{3746794A-FDC0-9546-8E7D-ACA8A0DD5FB2}"/>
+              </a:ext>
+            </a:extLst>
+          </p:cNvPr>
+          <p:cNvSpPr>
+            <a:spLocks noGrp="1"/>
+          </p:cNvSpPr>
+          <p:nvPr>
+            <p:ph type="sldNum" sz="quarter" idx="12"/>
+          </p:nvPr>
+        </p:nvSpPr>
+        <p:spPr>
+          <a:xfrm>
+            <a:off x="6635872" y="4767263"/>
+            <a:ext cx="2057400" cy="274637"/>
+          </a:xfrm>
+        </p:spPr>
+        <p:txBody>
+          <a:bodyPr/>
+          <a:lstStyle/>
+          <a:p>
+            <a:fld id="{A702BFF8-46AA-C848-A3A9-A030D34C3038}" type="slidenum">
+              <a:rPr lang="de-DE" smtClean="0"/>
+              <a:t>6</a:t>
+            </a:fld>
+            <a:endParaRPr lang="de-DE" dirty="0"/>
+          </a:p>
+        </p:txBody>
+      </p:sp>
+      <p:sp>
+        <p:nvSpPr>
+          <p:cNvPr id="8" name="Footer Placeholder 4">
+            <a:extLst>
+              <a:ext uri="{FF2B5EF4-FFF2-40B4-BE49-F238E27FC236}">
+                <a16:creationId xmlns:a16="http://schemas.microsoft.com/office/drawing/2014/main" id="{21694586-EAFA-3744-B963-2BCFA4F37221}"/>
+              </a:ext>
+            </a:extLst>
+          </p:cNvPr>
+          <p:cNvSpPr>
+            <a:spLocks noGrp="1"/>
+          </p:cNvSpPr>
+          <p:nvPr>
+            <p:ph type="ftr" sz="quarter" idx="3"/>
+          </p:nvPr>
+        </p:nvSpPr>
+        <p:spPr>
+          <a:xfrm>
+            <a:off x="3259537" y="4767263"/>
+            <a:ext cx="3565140" cy="274637"/>
+          </a:xfrm>
+        </p:spPr>
+        <p:txBody>
+          <a:bodyPr/>
+          <a:lstStyle/>
+          <a:p>
+            <a:r>
+              <a:rPr lang="de-DE" b="1" cap="all" dirty="0"/>
+              <a:t>BINGEN </a:t>
+            </a:r>
+            <a:r>
+              <a:rPr lang="de-DE" cap="all" dirty="0"/>
+              <a:t>Technical University </a:t>
+            </a:r>
+            <a:r>
+              <a:rPr lang="de-DE" cap="all" dirty="0" err="1"/>
+              <a:t>of</a:t>
+            </a:r>
+            <a:r>
+              <a:rPr lang="de-DE" cap="all" dirty="0"/>
+              <a:t> APPLIED SCIENCES</a:t>
+            </a:r>
+            <a:endParaRPr lang="de-DE" dirty="0"/>
+          </a:p>
+        </p:txBody>
+      </p:sp>
+    </p:spTree>
+    <p:extLst>
+      <p:ext uri="{BB962C8B-B14F-4D97-AF65-F5344CB8AC3E}">
+        <p14:creationId xmlns:p14="http://schemas.microsoft.com/office/powerpoint/2010/main" val="3441488451"/>
+      </p:ext>
+    </p:extLst>
+  </p:cSld>
+  <p:clrMapOvr>
+    <a:masterClrMapping/>
+  </p:clrMapOvr>
+</p:sld>
+</file>
+
+<file path=ppt/slides/slide7.xml><?xml version="1.0" encoding="utf-8"?>
+<p:sld xmlns:a="http://schemas.openxmlformats.org/drawingml/2006/main" xmlns:r="http://schemas.openxmlformats.org/officeDocument/2006/relationships" xmlns:p="http://schemas.openxmlformats.org/presentationml/2006/main">
+  <p:cSld>
+    <p:spTree>
+      <p:nvGrpSpPr>
+        <p:cNvPr id="1" name=""/>
+        <p:cNvGrpSpPr/>
+        <p:nvPr/>
+      </p:nvGrpSpPr>
+      <p:grpSpPr>
+        <a:xfrm>
+          <a:off x="0" y="0"/>
+          <a:ext cx="0" cy="0"/>
+          <a:chOff x="0" y="0"/>
+          <a:chExt cx="0" cy="0"/>
+        </a:xfrm>
+      </p:grpSpPr>
+      <p:sp>
+        <p:nvSpPr>
+          <p:cNvPr id="7" name="Inhaltsplatzhalter 6">
+            <a:extLst>
+              <a:ext uri="{FF2B5EF4-FFF2-40B4-BE49-F238E27FC236}">
+                <a16:creationId xmlns:a16="http://schemas.microsoft.com/office/drawing/2014/main" id="{AF826CE7-5883-11E6-A066-4E5CA4FE1F21}"/>
+              </a:ext>
+            </a:extLst>
+          </p:cNvPr>
+          <p:cNvSpPr>
+            <a:spLocks noGrp="1"/>
+          </p:cNvSpPr>
+          <p:nvPr>
+            <p:ph idx="1"/>
+          </p:nvPr>
+        </p:nvSpPr>
+        <p:spPr/>
+        <p:txBody>
+          <a:bodyPr>
+            <a:normAutofit fontScale="70000" lnSpcReduction="20000"/>
+          </a:bodyPr>
+          <a:lstStyle/>
+          <a:p>
+            <a:pPr marL="0" indent="0">
+              <a:buNone/>
+            </a:pPr>
+            <a:r>
+              <a:rPr lang="de-DE" dirty="0"/>
+              <a:t>https://external-content.duckduckgo.com/iu/?u=https%3A%2F%2Fuser-images.githubusercontent.com%2F33485020%2F108069438-5ee79d80-7089-11eb-8264-08fdda7e0d11.jpg&amp;f=1&amp;nofb=1&amp;ipt=d1276bb0aec725de15b67f3b7837131c832ee36cf7469ab49def5879f8df259e&amp;ipo=images</a:t>
+            </a:r>
+          </a:p>
+          <a:p>
+            <a:pPr marL="0" indent="0">
+              <a:buNone/>
+            </a:pPr>
+            <a:r>
+              <a:rPr lang="de-DE" dirty="0"/>
+              <a:t>https://external-content.duckduckgo.com/iu/?u=https%3A%2F%2Fwallpapercave.com%2Fwp%2FtQWo0PP.jpg&amp;f=1&amp;nofb=1&amp;ipt=026ebc8668636ac8324327a8609840e3981ea9173995cd2cfc4158e0ff10bb21&amp;ipo=images</a:t>
+            </a:r>
+          </a:p>
+          <a:p>
+            <a:pPr marL="0" indent="0">
+              <a:buNone/>
+            </a:pPr>
+            <a:r>
+              <a:rPr lang="de-DE" dirty="0"/>
+              <a:t>https://external-content.duckduckgo.com/iu/?u=https%3A%2F%2Fwww.trueanthem.com%2Fwp-content%2Fuploads%2F2023%2F05%2Fhuman-and-AI-collaboration-scaled.jpeg&amp;f=1&amp;nofb=1&amp;ipt=978c1c7b4bcbb32d1320f076db6d05c010dec3206090b5d59f1b02dd6718d12e&amp;ipo=images</a:t>
+            </a:r>
+          </a:p>
+          <a:p>
+            <a:pPr marL="0" indent="0">
+              <a:buNone/>
+            </a:pPr>
+            <a:endParaRPr lang="de-DE" dirty="0"/>
+          </a:p>
+          <a:p>
+            <a:pPr marL="0" indent="0">
+              <a:buNone/>
+            </a:pPr>
+            <a:endParaRPr lang="de-DE" dirty="0"/>
+          </a:p>
+        </p:txBody>
+      </p:sp>
+      <p:sp>
+        <p:nvSpPr>
+          <p:cNvPr id="3" name="Datumsplatzhalter 2">
+            <a:extLst>
+              <a:ext uri="{FF2B5EF4-FFF2-40B4-BE49-F238E27FC236}">
+                <a16:creationId xmlns:a16="http://schemas.microsoft.com/office/drawing/2014/main" id="{42B85D50-FABE-5A0E-5D09-23647BD2ED34}"/>
+              </a:ext>
+            </a:extLst>
+          </p:cNvPr>
+          <p:cNvSpPr>
+            <a:spLocks noGrp="1"/>
+          </p:cNvSpPr>
+          <p:nvPr>
+            <p:ph type="dt" sz="half" idx="10"/>
+          </p:nvPr>
+        </p:nvSpPr>
+        <p:spPr/>
+        <p:txBody>
+          <a:bodyPr/>
+          <a:lstStyle/>
+          <a:p>
+            <a:fld id="{5D8820E3-F72B-440D-814E-5831159EA788}" type="datetime1">
+              <a:rPr lang="en-US" smtClean="0"/>
+              <a:t>11/9/2024</a:t>
+            </a:fld>
+            <a:endParaRPr lang="de-DE" dirty="0"/>
+          </a:p>
+        </p:txBody>
+      </p:sp>
+      <p:sp>
+        <p:nvSpPr>
+          <p:cNvPr id="5" name="Fußzeilenplatzhalter 4">
+            <a:extLst>
+              <a:ext uri="{FF2B5EF4-FFF2-40B4-BE49-F238E27FC236}">
+                <a16:creationId xmlns:a16="http://schemas.microsoft.com/office/drawing/2014/main" id="{4CAAFABB-CF9F-46F3-203A-DD91E2821453}"/>
+              </a:ext>
+            </a:extLst>
+          </p:cNvPr>
+          <p:cNvSpPr>
+            <a:spLocks noGrp="1"/>
+          </p:cNvSpPr>
+          <p:nvPr>
+            <p:ph type="ftr" sz="quarter" idx="11"/>
+          </p:nvPr>
+        </p:nvSpPr>
+        <p:spPr/>
+        <p:txBody>
+          <a:bodyPr/>
+          <a:lstStyle/>
+          <a:p>
+            <a:r>
+              <a:rPr lang="de-DE" b="1" cap="all"/>
+              <a:t>BINGEN </a:t>
+            </a:r>
+            <a:r>
+              <a:rPr lang="de-DE" cap="all"/>
+              <a:t>Technical University of APPLIED SCIENCES</a:t>
+            </a:r>
+            <a:endParaRPr lang="de-DE" dirty="0"/>
+          </a:p>
+        </p:txBody>
+      </p:sp>
+      <p:sp>
+        <p:nvSpPr>
+          <p:cNvPr id="4" name="Foliennummernplatzhalter 3">
+            <a:extLst>
+              <a:ext uri="{FF2B5EF4-FFF2-40B4-BE49-F238E27FC236}">
+                <a16:creationId xmlns:a16="http://schemas.microsoft.com/office/drawing/2014/main" id="{CD36C928-A711-FECF-AF25-B6914EB41206}"/>
+              </a:ext>
+            </a:extLst>
+          </p:cNvPr>
+          <p:cNvSpPr>
+            <a:spLocks noGrp="1"/>
+          </p:cNvSpPr>
+          <p:nvPr>
+            <p:ph type="sldNum" sz="quarter" idx="12"/>
+          </p:nvPr>
+        </p:nvSpPr>
+        <p:spPr/>
+        <p:txBody>
+          <a:bodyPr/>
+          <a:lstStyle/>
+          <a:p>
+            <a:fld id="{98B8A348-B8B5-F14A-B6F5-8259AF0C90BB}" type="slidenum">
+              <a:rPr lang="de-DE" smtClean="0"/>
+              <a:pPr/>
+              <a:t>7</a:t>
+            </a:fld>
+            <a:endParaRPr lang="de-DE" dirty="0"/>
+          </a:p>
+        </p:txBody>
+      </p:sp>
+      <p:sp>
+        <p:nvSpPr>
+          <p:cNvPr id="6" name="Titel 5">
+            <a:extLst>
+              <a:ext uri="{FF2B5EF4-FFF2-40B4-BE49-F238E27FC236}">
+                <a16:creationId xmlns:a16="http://schemas.microsoft.com/office/drawing/2014/main" id="{F0A6553F-878F-9226-102B-436A24A0EADA}"/>
+              </a:ext>
+            </a:extLst>
+          </p:cNvPr>
+          <p:cNvSpPr>
+            <a:spLocks noGrp="1"/>
+          </p:cNvSpPr>
+          <p:nvPr>
+            <p:ph type="title"/>
+          </p:nvPr>
+        </p:nvSpPr>
+        <p:spPr/>
+        <p:txBody>
+          <a:bodyPr/>
+          <a:lstStyle/>
+          <a:p>
+            <a:r>
+              <a:rPr lang="de-DE" dirty="0"/>
+              <a:t>References</a:t>
+            </a:r>
+          </a:p>
+        </p:txBody>
+      </p:sp>
+    </p:spTree>
+    <p:extLst>
+      <p:ext uri="{BB962C8B-B14F-4D97-AF65-F5344CB8AC3E}">
+        <p14:creationId xmlns:p14="http://schemas.microsoft.com/office/powerpoint/2010/main" val="3054515856"/>
       </p:ext>
     </p:extLst>
   </p:cSld>

</xml_diff>

<commit_message>
Updated again presentation and decisions for modeling
</commit_message>
<xml_diff>
--- a/slides-decks/pitch-presentation.pptx
+++ b/slides-decks/pitch-presentation.pptx
@@ -1125,7 +1125,24 @@
               </a:solidFill>
               <a:latin typeface="+mj-lt"/>
             </a:rPr>
-            <a:t>Expandable to other genres</a:t>
+            <a:t>Expandable to other Customer</a:t>
+          </a:r>
+          <a:br>
+            <a:rPr lang="en-GB" b="0" dirty="0">
+              <a:solidFill>
+                <a:srgbClr val="000000"/>
+              </a:solidFill>
+              <a:latin typeface="+mj-lt"/>
+            </a:rPr>
+          </a:br>
+          <a:r>
+            <a:rPr lang="en-GB" b="0" dirty="0">
+              <a:solidFill>
+                <a:srgbClr val="000000"/>
+              </a:solidFill>
+              <a:latin typeface="+mj-lt"/>
+            </a:rPr>
+            <a:t>bases</a:t>
           </a:r>
           <a:endParaRPr lang="en-US" b="0" dirty="0">
             <a:solidFill>
@@ -1536,7 +1553,7 @@
         </a:bodyPr>
         <a:lstStyle/>
         <a:p>
-          <a:pPr marL="0" lvl="0" indent="0" algn="ctr" defTabSz="711200">
+          <a:pPr marL="0" lvl="0" indent="0" algn="ctr" defTabSz="622300">
             <a:lnSpc>
               <a:spcPct val="100000"/>
             </a:lnSpc>
@@ -1550,7 +1567,7 @@
             <a:defRPr cap="all"/>
           </a:pPr>
           <a:r>
-            <a:rPr lang="en-GB" sz="1600" b="0" kern="1200" dirty="0">
+            <a:rPr lang="en-GB" sz="1400" b="0" kern="1200" dirty="0">
               <a:solidFill>
                 <a:srgbClr val="000000"/>
               </a:solidFill>
@@ -1558,7 +1575,7 @@
             </a:rPr>
             <a:t>Profit by advertisement</a:t>
           </a:r>
-          <a:endParaRPr lang="en-US" sz="1600" b="0" kern="1200" dirty="0">
+          <a:endParaRPr lang="en-US" sz="1400" b="0" kern="1200" dirty="0">
             <a:solidFill>
               <a:srgbClr val="000000"/>
             </a:solidFill>
@@ -1696,7 +1713,7 @@
         </a:bodyPr>
         <a:lstStyle/>
         <a:p>
-          <a:pPr marL="0" lvl="0" indent="0" algn="ctr" defTabSz="711200">
+          <a:pPr marL="0" lvl="0" indent="0" algn="ctr" defTabSz="622300">
             <a:lnSpc>
               <a:spcPct val="100000"/>
             </a:lnSpc>
@@ -1710,7 +1727,7 @@
             <a:defRPr cap="all"/>
           </a:pPr>
           <a:r>
-            <a:rPr lang="en-GB" sz="1600" b="0" kern="1200" dirty="0">
+            <a:rPr lang="en-GB" sz="1400" b="0" kern="1200" dirty="0">
               <a:solidFill>
                 <a:srgbClr val="000000"/>
               </a:solidFill>
@@ -1718,7 +1735,7 @@
             </a:rPr>
             <a:t>Watching more movies</a:t>
           </a:r>
-          <a:endParaRPr lang="en-US" sz="1600" b="0" kern="1200" dirty="0">
+          <a:endParaRPr lang="en-US" sz="1400" b="0" kern="1200" dirty="0">
             <a:solidFill>
               <a:srgbClr val="000000"/>
             </a:solidFill>
@@ -1856,7 +1873,7 @@
         </a:bodyPr>
         <a:lstStyle/>
         <a:p>
-          <a:pPr marL="0" lvl="0" indent="0" algn="ctr" defTabSz="711200">
+          <a:pPr marL="0" lvl="0" indent="0" algn="ctr" defTabSz="622300">
             <a:lnSpc>
               <a:spcPct val="100000"/>
             </a:lnSpc>
@@ -1870,7 +1887,7 @@
             <a:defRPr cap="all"/>
           </a:pPr>
           <a:r>
-            <a:rPr lang="en-GB" sz="1600" b="0" kern="1200" dirty="0">
+            <a:rPr lang="en-GB" sz="1400" b="0" kern="1200" dirty="0">
               <a:solidFill>
                 <a:srgbClr val="000000"/>
               </a:solidFill>
@@ -1878,7 +1895,7 @@
             </a:rPr>
             <a:t>Expandable to series</a:t>
           </a:r>
-          <a:endParaRPr lang="en-US" sz="1600" b="0" kern="1200" dirty="0">
+          <a:endParaRPr lang="en-US" sz="1400" b="0" kern="1200" dirty="0">
             <a:solidFill>
               <a:srgbClr val="000000"/>
             </a:solidFill>
@@ -2016,7 +2033,7 @@
         </a:bodyPr>
         <a:lstStyle/>
         <a:p>
-          <a:pPr marL="0" lvl="0" indent="0" algn="ctr" defTabSz="711200">
+          <a:pPr marL="0" lvl="0" indent="0" algn="ctr" defTabSz="622300">
             <a:lnSpc>
               <a:spcPct val="100000"/>
             </a:lnSpc>
@@ -2030,15 +2047,32 @@
             <a:defRPr cap="all"/>
           </a:pPr>
           <a:r>
-            <a:rPr lang="en-GB" sz="1600" b="0" kern="1200" dirty="0">
+            <a:rPr lang="en-GB" sz="1400" b="0" kern="1200" dirty="0">
               <a:solidFill>
                 <a:srgbClr val="000000"/>
               </a:solidFill>
               <a:latin typeface="+mj-lt"/>
             </a:rPr>
-            <a:t>Expandable to other genres</a:t>
+            <a:t>Expandable to other Customer</a:t>
           </a:r>
-          <a:endParaRPr lang="en-US" sz="1600" b="0" kern="1200" dirty="0">
+          <a:br>
+            <a:rPr lang="en-GB" sz="1400" b="0" kern="1200" dirty="0">
+              <a:solidFill>
+                <a:srgbClr val="000000"/>
+              </a:solidFill>
+              <a:latin typeface="+mj-lt"/>
+            </a:rPr>
+          </a:br>
+          <a:r>
+            <a:rPr lang="en-GB" sz="1400" b="0" kern="1200" dirty="0">
+              <a:solidFill>
+                <a:srgbClr val="000000"/>
+              </a:solidFill>
+              <a:latin typeface="+mj-lt"/>
+            </a:rPr>
+            <a:t>bases</a:t>
+          </a:r>
+          <a:endParaRPr lang="en-US" sz="1400" b="0" kern="1200" dirty="0">
             <a:solidFill>
               <a:srgbClr val="000000"/>
             </a:solidFill>
@@ -10787,7 +10821,7 @@
             <p:ph idx="1"/>
             <p:extLst>
               <p:ext uri="{D42A27DB-BD31-4B8C-83A1-F6EECF244321}">
-                <p14:modId xmlns:p14="http://schemas.microsoft.com/office/powerpoint/2010/main" val="3046825014"/>
+                <p14:modId xmlns:p14="http://schemas.microsoft.com/office/powerpoint/2010/main" val="1355977786"/>
               </p:ext>
             </p:extLst>
           </p:nvPr>

</xml_diff>